<commit_message>
Se ha corregido el ejercicio de Knn. Se ha realizado el notebook de clustering
</commit_message>
<xml_diff>
--- a/2-No_Supervisado/1-PCA/Teoria/Machine Learning - PCA.pptx
+++ b/2-No_Supervisado/1-PCA/Teoria/Machine Learning - PCA.pptx
@@ -1318,9 +1318,12 @@
           </a:bodyPr>
           <a:lstStyle/>
           <a:p>
-            <a:endParaRPr lang="es-ES" sz="2000" b="0" strike="noStrike" spc="-1">
-              <a:latin typeface="Arial"/>
-            </a:endParaRPr>
+            <a:r>
+              <a:rPr lang="es-ES" sz="2000" b="0" strike="noStrike" spc="-1" dirty="0">
+                <a:latin typeface="Arial"/>
+              </a:rPr>
+              <a:t>Se coge la dimensión que más puntos tiene, en este caso el tercero</a:t>
+            </a:r>
           </a:p>
         </p:txBody>
       </p:sp>

</xml_diff>